<commit_message>
#2, #8: update `post` + `project`: re-position images into `content`
</commit_message>
<xml_diff>
--- a/content/top/viz_gallery.pptx
+++ b/content/top/viz_gallery.pptx
@@ -105,6 +105,11 @@
       </a:defRPr>
     </a:lvl9pPr>
   </p:defaultTextStyle>
+  <p:extLst>
+    <p:ext uri="{EFAFB233-063F-42B5-8137-9DF3F51BA10A}">
+      <p15:sldGuideLst xmlns:p15="http://schemas.microsoft.com/office/powerpoint/2012/main"/>
+    </p:ext>
+  </p:extLst>
 </p:presentation>
 </file>
 
@@ -255,7 +260,7 @@
           <a:p>
             <a:fld id="{6C16F84E-1ECF-4378-B53D-E0D927CDA7DA}" type="datetimeFigureOut">
               <a:rPr lang="en-US" smtClean="0"/>
-              <a:t>12/23/2023</a:t>
+              <a:t>12/28/2023</a:t>
             </a:fld>
             <a:endParaRPr lang="en-US"/>
           </a:p>
@@ -453,7 +458,7 @@
           <a:p>
             <a:fld id="{6C16F84E-1ECF-4378-B53D-E0D927CDA7DA}" type="datetimeFigureOut">
               <a:rPr lang="en-US" smtClean="0"/>
-              <a:t>12/23/2023</a:t>
+              <a:t>12/28/2023</a:t>
             </a:fld>
             <a:endParaRPr lang="en-US"/>
           </a:p>
@@ -661,7 +666,7 @@
           <a:p>
             <a:fld id="{6C16F84E-1ECF-4378-B53D-E0D927CDA7DA}" type="datetimeFigureOut">
               <a:rPr lang="en-US" smtClean="0"/>
-              <a:t>12/23/2023</a:t>
+              <a:t>12/28/2023</a:t>
             </a:fld>
             <a:endParaRPr lang="en-US"/>
           </a:p>
@@ -859,7 +864,7 @@
           <a:p>
             <a:fld id="{6C16F84E-1ECF-4378-B53D-E0D927CDA7DA}" type="datetimeFigureOut">
               <a:rPr lang="en-US" smtClean="0"/>
-              <a:t>12/23/2023</a:t>
+              <a:t>12/28/2023</a:t>
             </a:fld>
             <a:endParaRPr lang="en-US"/>
           </a:p>
@@ -1134,7 +1139,7 @@
           <a:p>
             <a:fld id="{6C16F84E-1ECF-4378-B53D-E0D927CDA7DA}" type="datetimeFigureOut">
               <a:rPr lang="en-US" smtClean="0"/>
-              <a:t>12/23/2023</a:t>
+              <a:t>12/28/2023</a:t>
             </a:fld>
             <a:endParaRPr lang="en-US"/>
           </a:p>
@@ -1399,7 +1404,7 @@
           <a:p>
             <a:fld id="{6C16F84E-1ECF-4378-B53D-E0D927CDA7DA}" type="datetimeFigureOut">
               <a:rPr lang="en-US" smtClean="0"/>
-              <a:t>12/23/2023</a:t>
+              <a:t>12/28/2023</a:t>
             </a:fld>
             <a:endParaRPr lang="en-US"/>
           </a:p>
@@ -1811,7 +1816,7 @@
           <a:p>
             <a:fld id="{6C16F84E-1ECF-4378-B53D-E0D927CDA7DA}" type="datetimeFigureOut">
               <a:rPr lang="en-US" smtClean="0"/>
-              <a:t>12/23/2023</a:t>
+              <a:t>12/28/2023</a:t>
             </a:fld>
             <a:endParaRPr lang="en-US"/>
           </a:p>
@@ -1952,7 +1957,7 @@
           <a:p>
             <a:fld id="{6C16F84E-1ECF-4378-B53D-E0D927CDA7DA}" type="datetimeFigureOut">
               <a:rPr lang="en-US" smtClean="0"/>
-              <a:t>12/23/2023</a:t>
+              <a:t>12/28/2023</a:t>
             </a:fld>
             <a:endParaRPr lang="en-US"/>
           </a:p>
@@ -2065,7 +2070,7 @@
           <a:p>
             <a:fld id="{6C16F84E-1ECF-4378-B53D-E0D927CDA7DA}" type="datetimeFigureOut">
               <a:rPr lang="en-US" smtClean="0"/>
-              <a:t>12/23/2023</a:t>
+              <a:t>12/28/2023</a:t>
             </a:fld>
             <a:endParaRPr lang="en-US"/>
           </a:p>
@@ -2376,7 +2381,7 @@
           <a:p>
             <a:fld id="{6C16F84E-1ECF-4378-B53D-E0D927CDA7DA}" type="datetimeFigureOut">
               <a:rPr lang="en-US" smtClean="0"/>
-              <a:t>12/23/2023</a:t>
+              <a:t>12/28/2023</a:t>
             </a:fld>
             <a:endParaRPr lang="en-US"/>
           </a:p>
@@ -2664,7 +2669,7 @@
           <a:p>
             <a:fld id="{6C16F84E-1ECF-4378-B53D-E0D927CDA7DA}" type="datetimeFigureOut">
               <a:rPr lang="en-US" smtClean="0"/>
-              <a:t>12/23/2023</a:t>
+              <a:t>12/28/2023</a:t>
             </a:fld>
             <a:endParaRPr lang="en-US"/>
           </a:p>
@@ -2905,7 +2910,7 @@
           <a:p>
             <a:fld id="{6C16F84E-1ECF-4378-B53D-E0D927CDA7DA}" type="datetimeFigureOut">
               <a:rPr lang="en-US" smtClean="0"/>
-              <a:t>12/23/2023</a:t>
+              <a:t>12/28/2023</a:t>
             </a:fld>
             <a:endParaRPr lang="en-US"/>
           </a:p>
@@ -4110,10 +4115,10 @@
         </p:nvGrpSpPr>
         <p:grpSpPr>
           <a:xfrm>
-            <a:off x="6151705" y="2143574"/>
-            <a:ext cx="2428860" cy="2247466"/>
-            <a:chOff x="4282156" y="101435"/>
-            <a:chExt cx="2428860" cy="2247466"/>
+            <a:off x="6147297" y="2150990"/>
+            <a:ext cx="2363110" cy="2182547"/>
+            <a:chOff x="4277748" y="108851"/>
+            <a:chExt cx="2363110" cy="2182547"/>
           </a:xfrm>
         </p:grpSpPr>
         <p:pic>
@@ -4138,13 +4143,13 @@
                 </a:ext>
               </a:extLst>
             </a:blip>
-            <a:srcRect l="11421" t="22406" r="2209" b="7658"/>
+            <a:srcRect l="-3482" t="4178" r="-8830" b="5999"/>
             <a:stretch/>
           </p:blipFill>
           <p:spPr>
             <a:xfrm>
-              <a:off x="4282156" y="101435"/>
-              <a:ext cx="2428860" cy="2247466"/>
+              <a:off x="4277748" y="119723"/>
+              <a:ext cx="2360116" cy="2157069"/>
             </a:xfrm>
             <a:prstGeom prst="ellipse">
               <a:avLst/>
@@ -4357,7 +4362,7 @@
                 </a:ext>
               </a:extLst>
             </a:blip>
-            <a:srcRect l="11797" t="2237" r="4295" b="39965"/>
+            <a:srcRect l="10327" t="13953" r="4915" b="27664"/>
             <a:stretch/>
           </p:blipFill>
           <p:spPr>
@@ -4390,7 +4395,7 @@
           </p:nvSpPr>
           <p:spPr>
             <a:xfrm>
-              <a:off x="2770633" y="2175460"/>
+              <a:off x="2779777" y="2138884"/>
               <a:ext cx="2358701" cy="2182547"/>
             </a:xfrm>
             <a:prstGeom prst="ellipse">

</xml_diff>